<commit_message>
update Presentation and add UI-Design Screenshot
</commit_message>
<xml_diff>
--- a/TTT-Presentation.pptx
+++ b/TTT-Presentation.pptx
@@ -116,6 +116,11 @@
       </a:defRPr>
     </a:lvl9pPr>
   </p:defaultTextStyle>
+  <p:extLst>
+    <p:ext uri="{EFAFB233-063F-42B5-8137-9DF3F51BA10A}">
+      <p15:sldGuideLst xmlns:p15="http://schemas.microsoft.com/office/powerpoint/2012/main"/>
+    </p:ext>
+  </p:extLst>
 </p:presentation>
 </file>
 
@@ -21295,7 +21300,7 @@
           <a:bodyPr/>
           <a:lstStyle/>
           <a:p>
-            <a:endParaRPr lang="en-CH"/>
+            <a:endParaRPr lang="en-CH" dirty="0"/>
           </a:p>
         </p:txBody>
       </p:sp>
@@ -21484,7 +21489,7 @@
           <a:p>
             <a:fld id="{2DFC8C24-2165-7C48-82EB-69BB9CA880BB}" type="datetimeFigureOut">
               <a:rPr lang="en-CH" smtClean="0"/>
-              <a:t>05.03.2024</a:t>
+              <a:t>06.03.2024</a:t>
             </a:fld>
             <a:endParaRPr lang="en-CH"/>
           </a:p>
@@ -21684,7 +21689,7 @@
           <a:p>
             <a:fld id="{2DFC8C24-2165-7C48-82EB-69BB9CA880BB}" type="datetimeFigureOut">
               <a:rPr lang="en-CH" smtClean="0"/>
-              <a:t>05.03.2024</a:t>
+              <a:t>06.03.2024</a:t>
             </a:fld>
             <a:endParaRPr lang="en-CH"/>
           </a:p>
@@ -21894,7 +21899,7 @@
           <a:p>
             <a:fld id="{2DFC8C24-2165-7C48-82EB-69BB9CA880BB}" type="datetimeFigureOut">
               <a:rPr lang="en-CH" smtClean="0"/>
-              <a:t>05.03.2024</a:t>
+              <a:t>06.03.2024</a:t>
             </a:fld>
             <a:endParaRPr lang="en-CH"/>
           </a:p>
@@ -22094,7 +22099,7 @@
           <a:p>
             <a:fld id="{2DFC8C24-2165-7C48-82EB-69BB9CA880BB}" type="datetimeFigureOut">
               <a:rPr lang="en-CH" smtClean="0"/>
-              <a:t>05.03.2024</a:t>
+              <a:t>06.03.2024</a:t>
             </a:fld>
             <a:endParaRPr lang="en-CH"/>
           </a:p>
@@ -22294,7 +22299,7 @@
           <a:p>
             <a:fld id="{2DFC8C24-2165-7C48-82EB-69BB9CA880BB}" type="datetimeFigureOut">
               <a:rPr lang="en-CH" smtClean="0"/>
-              <a:t>05.03.2024</a:t>
+              <a:t>06.03.2024</a:t>
             </a:fld>
             <a:endParaRPr lang="en-CH"/>
           </a:p>
@@ -22570,7 +22575,7 @@
           <a:p>
             <a:fld id="{2DFC8C24-2165-7C48-82EB-69BB9CA880BB}" type="datetimeFigureOut">
               <a:rPr lang="en-CH" smtClean="0"/>
-              <a:t>05.03.2024</a:t>
+              <a:t>06.03.2024</a:t>
             </a:fld>
             <a:endParaRPr lang="en-CH"/>
           </a:p>
@@ -22838,7 +22843,7 @@
           <a:p>
             <a:fld id="{2DFC8C24-2165-7C48-82EB-69BB9CA880BB}" type="datetimeFigureOut">
               <a:rPr lang="en-CH" smtClean="0"/>
-              <a:t>05.03.2024</a:t>
+              <a:t>06.03.2024</a:t>
             </a:fld>
             <a:endParaRPr lang="en-CH"/>
           </a:p>
@@ -23253,7 +23258,7 @@
           <a:p>
             <a:fld id="{2DFC8C24-2165-7C48-82EB-69BB9CA880BB}" type="datetimeFigureOut">
               <a:rPr lang="en-CH" smtClean="0"/>
-              <a:t>05.03.2024</a:t>
+              <a:t>06.03.2024</a:t>
             </a:fld>
             <a:endParaRPr lang="en-CH"/>
           </a:p>
@@ -23395,7 +23400,7 @@
           <a:p>
             <a:fld id="{2DFC8C24-2165-7C48-82EB-69BB9CA880BB}" type="datetimeFigureOut">
               <a:rPr lang="en-CH" smtClean="0"/>
-              <a:t>05.03.2024</a:t>
+              <a:t>06.03.2024</a:t>
             </a:fld>
             <a:endParaRPr lang="en-CH"/>
           </a:p>
@@ -23508,7 +23513,7 @@
           <a:p>
             <a:fld id="{2DFC8C24-2165-7C48-82EB-69BB9CA880BB}" type="datetimeFigureOut">
               <a:rPr lang="en-CH" smtClean="0"/>
-              <a:t>05.03.2024</a:t>
+              <a:t>06.03.2024</a:t>
             </a:fld>
             <a:endParaRPr lang="en-CH"/>
           </a:p>
@@ -23821,7 +23826,7 @@
           <a:p>
             <a:fld id="{2DFC8C24-2165-7C48-82EB-69BB9CA880BB}" type="datetimeFigureOut">
               <a:rPr lang="en-CH" smtClean="0"/>
-              <a:t>05.03.2024</a:t>
+              <a:t>06.03.2024</a:t>
             </a:fld>
             <a:endParaRPr lang="en-CH"/>
           </a:p>
@@ -24110,7 +24115,7 @@
           <a:p>
             <a:fld id="{2DFC8C24-2165-7C48-82EB-69BB9CA880BB}" type="datetimeFigureOut">
               <a:rPr lang="en-CH" smtClean="0"/>
-              <a:t>05.03.2024</a:t>
+              <a:t>06.03.2024</a:t>
             </a:fld>
             <a:endParaRPr lang="en-CH"/>
           </a:p>
@@ -24353,7 +24358,7 @@
           <a:p>
             <a:fld id="{2DFC8C24-2165-7C48-82EB-69BB9CA880BB}" type="datetimeFigureOut">
               <a:rPr lang="en-CH" smtClean="0"/>
-              <a:t>05.03.2024</a:t>
+              <a:t>06.03.2024</a:t>
             </a:fld>
             <a:endParaRPr lang="en-CH"/>
           </a:p>
@@ -25754,7 +25759,7 @@
           <a:p>
             <a:pPr algn="r"/>
             <a:r>
-              <a:rPr lang="en-US" sz="6000" kern="1200">
+              <a:rPr lang="en-US" sz="6000" kern="1200" dirty="0" err="1">
                 <a:solidFill>
                   <a:schemeClr val="tx1"/>
                 </a:solidFill>
@@ -25764,6 +25769,14 @@
               </a:rPr>
               <a:t>Fragen</a:t>
             </a:r>
+            <a:endParaRPr lang="en-US" sz="6000" kern="1200" dirty="0">
+              <a:solidFill>
+                <a:schemeClr val="tx1"/>
+              </a:solidFill>
+              <a:latin typeface="+mj-lt"/>
+              <a:ea typeface="+mj-ea"/>
+              <a:cs typeface="+mj-cs"/>
+            </a:endParaRPr>
           </a:p>
         </p:txBody>
       </p:sp>
@@ -25798,17 +25811,14 @@
             <a:pPr marL="0" indent="0" algn="r">
               <a:buNone/>
             </a:pPr>
-            <a:r>
-              <a:rPr lang="en-US" sz="2400" kern="1200">
-                <a:solidFill>
-                  <a:schemeClr val="tx1"/>
-                </a:solidFill>
-                <a:latin typeface="+mn-lt"/>
-                <a:ea typeface="+mn-ea"/>
-                <a:cs typeface="+mn-cs"/>
-              </a:rPr>
-              <a:t>Offen für Fragen aus dem Publikum</a:t>
-            </a:r>
+            <a:endParaRPr lang="en-US" sz="2400" kern="1200" dirty="0">
+              <a:solidFill>
+                <a:schemeClr val="tx1"/>
+              </a:solidFill>
+              <a:latin typeface="+mn-lt"/>
+              <a:ea typeface="+mn-ea"/>
+              <a:cs typeface="+mn-cs"/>
+            </a:endParaRPr>
           </a:p>
         </p:txBody>
       </p:sp>
@@ -28829,10 +28839,6 @@
           </a:p>
           <a:p>
             <a:r>
-              <a:rPr lang="en-GB" dirty="0"/>
-              <a:t> </a:t>
-            </a:r>
-            <a:r>
               <a:rPr lang="en-GB" dirty="0" err="1"/>
               <a:t>Korrigieren</a:t>
             </a:r>

</xml_diff>